<commit_message>
disable slide that I dont want to show any longer
</commit_message>
<xml_diff>
--- a/2019-08 PowerShell Chattanooga/PSRemoting - From 0 to Lockdown.pptx
+++ b/2019-08 PowerShell Chattanooga/PSRemoting - From 0 to Lockdown.pptx
@@ -6527,7 +6527,7 @@
         <a:p>
           <a:r>
             <a:rPr lang="en-US" b="1" dirty="0"/>
-            <a:t>Logging can fill you the </a:t>
+            <a:t>Logging can fill up the </a:t>
           </a:r>
           <a:r>
             <a:rPr lang="en-US" b="1" dirty="0" err="1"/>
@@ -6535,7 +6535,14 @@
           </a:r>
           <a:r>
             <a:rPr lang="en-US" b="1" dirty="0"/>
-            <a:t> , so increase you log size to 1GB if possible</a:t>
+            <a:t> quickly. </a:t>
+          </a:r>
+          <a:br>
+            <a:rPr lang="en-US" b="1" dirty="0"/>
+          </a:br>
+          <a:r>
+            <a:rPr lang="en-US" b="1" dirty="0"/>
+            <a:t>Increase log size to 1GB +if possible</a:t>
           </a:r>
           <a:endParaRPr lang="en-US" dirty="0"/>
         </a:p>
@@ -6610,7 +6617,7 @@
       <dgm:spPr/>
     </dgm:pt>
     <dgm:pt modelId="{EBF8F1C4-3B9C-45AB-A27C-1B10509A7DB6}" type="pres">
-      <dgm:prSet presAssocID="{2045E2C2-DC82-4A36-BAAF-036E7BF4685D}" presName="node" presStyleLbl="node1" presStyleIdx="0" presStyleCnt="5">
+      <dgm:prSet presAssocID="{2045E2C2-DC82-4A36-BAAF-036E7BF4685D}" presName="node" presStyleLbl="node1" presStyleIdx="0" presStyleCnt="5" custScaleY="126327">
         <dgm:presLayoutVars>
           <dgm:bulletEnabled val="1"/>
         </dgm:presLayoutVars>
@@ -6626,7 +6633,7 @@
       <dgm:spPr/>
     </dgm:pt>
     <dgm:pt modelId="{6D67AE28-6B95-4EA2-9047-BC6EEDCD4178}" type="pres">
-      <dgm:prSet presAssocID="{9640532E-559F-42CE-B4DE-65B2C2342C87}" presName="node" presStyleLbl="node1" presStyleIdx="1" presStyleCnt="5">
+      <dgm:prSet presAssocID="{9640532E-559F-42CE-B4DE-65B2C2342C87}" presName="node" presStyleLbl="node1" presStyleIdx="1" presStyleCnt="5" custScaleY="126327">
         <dgm:presLayoutVars>
           <dgm:bulletEnabled val="1"/>
         </dgm:presLayoutVars>
@@ -6642,7 +6649,7 @@
       <dgm:spPr/>
     </dgm:pt>
     <dgm:pt modelId="{BE95DEB1-1111-461E-94AD-C14F6FDA2ED3}" type="pres">
-      <dgm:prSet presAssocID="{4876DF4A-9D29-4D80-B034-C2225B312252}" presName="node" presStyleLbl="node1" presStyleIdx="2" presStyleCnt="5">
+      <dgm:prSet presAssocID="{4876DF4A-9D29-4D80-B034-C2225B312252}" presName="node" presStyleLbl="node1" presStyleIdx="2" presStyleCnt="5" custScaleY="126327">
         <dgm:presLayoutVars>
           <dgm:bulletEnabled val="1"/>
         </dgm:presLayoutVars>
@@ -6658,7 +6665,7 @@
       <dgm:spPr/>
     </dgm:pt>
     <dgm:pt modelId="{7EBA245D-D6D0-48E5-862A-F51D0CB74C5E}" type="pres">
-      <dgm:prSet presAssocID="{B5C65944-7569-4384-BE78-15F4301A2AAB}" presName="node" presStyleLbl="node1" presStyleIdx="3" presStyleCnt="5">
+      <dgm:prSet presAssocID="{B5C65944-7569-4384-BE78-15F4301A2AAB}" presName="node" presStyleLbl="node1" presStyleIdx="3" presStyleCnt="5" custScaleX="123020" custScaleY="126327">
         <dgm:presLayoutVars>
           <dgm:bulletEnabled val="1"/>
         </dgm:presLayoutVars>
@@ -6674,7 +6681,7 @@
       <dgm:spPr/>
     </dgm:pt>
     <dgm:pt modelId="{B40405FA-C33E-41D5-83A9-772FCB8F754D}" type="pres">
-      <dgm:prSet presAssocID="{099563AE-7F46-40A4-9927-E86D3CEEBDEF}" presName="node" presStyleLbl="node1" presStyleIdx="4" presStyleCnt="5">
+      <dgm:prSet presAssocID="{099563AE-7F46-40A4-9927-E86D3CEEBDEF}" presName="node" presStyleLbl="node1" presStyleIdx="4" presStyleCnt="5" custScaleY="126327">
         <dgm:presLayoutVars>
           <dgm:bulletEnabled val="1"/>
         </dgm:presLayoutVars>
@@ -9267,8 +9274,8 @@
       </dsp:nvSpPr>
       <dsp:spPr>
         <a:xfrm>
-          <a:off x="4306" y="525491"/>
-          <a:ext cx="1334946" cy="1651604"/>
+          <a:off x="5754" y="461643"/>
+          <a:ext cx="1463581" cy="1779300"/>
         </a:xfrm>
         <a:prstGeom prst="roundRect">
           <a:avLst>
@@ -9312,12 +9319,12 @@
         </a:fontRef>
       </dsp:style>
       <dsp:txBody>
-        <a:bodyPr spcFirstLastPara="0" vert="horz" wrap="square" lIns="60960" tIns="60960" rIns="60960" bIns="60960" numCol="1" spcCol="1270" anchor="ctr" anchorCtr="0">
+        <a:bodyPr spcFirstLastPara="0" vert="horz" wrap="square" lIns="64770" tIns="64770" rIns="64770" bIns="64770" numCol="1" spcCol="1270" anchor="ctr" anchorCtr="0">
           <a:noAutofit/>
         </a:bodyPr>
         <a:lstStyle/>
         <a:p>
-          <a:pPr marL="0" lvl="0" indent="0" algn="ctr" defTabSz="711200">
+          <a:pPr marL="0" lvl="0" indent="0" algn="ctr" defTabSz="755650">
             <a:lnSpc>
               <a:spcPct val="90000"/>
             </a:lnSpc>
@@ -9330,15 +9337,15 @@
             <a:buNone/>
           </a:pPr>
           <a:r>
-            <a:rPr lang="en-US" sz="1600" b="1" kern="1200" dirty="0"/>
+            <a:rPr lang="en-US" sz="1700" b="1" kern="1200" dirty="0"/>
             <a:t>Three different logging options</a:t>
           </a:r>
-          <a:endParaRPr lang="en-US" sz="1600" kern="1200" dirty="0"/>
+          <a:endParaRPr lang="en-US" sz="1700" kern="1200" dirty="0"/>
         </a:p>
       </dsp:txBody>
       <dsp:txXfrm>
-        <a:off x="43405" y="564590"/>
-        <a:ext cx="1256748" cy="1573406"/>
+        <a:off x="48621" y="504510"/>
+        <a:ext cx="1377847" cy="1693566"/>
       </dsp:txXfrm>
     </dsp:sp>
     <dsp:sp modelId="{F786469A-65F6-4D0F-88D9-08322B919C4D}">
@@ -9348,8 +9355,8 @@
       </dsp:nvSpPr>
       <dsp:spPr>
         <a:xfrm>
-          <a:off x="1472747" y="1185760"/>
-          <a:ext cx="283008" cy="331066"/>
+          <a:off x="1615694" y="1169809"/>
+          <a:ext cx="310279" cy="362968"/>
         </a:xfrm>
         <a:prstGeom prst="rightArrow">
           <a:avLst>
@@ -9391,7 +9398,7 @@
         </a:bodyPr>
         <a:lstStyle/>
         <a:p>
-          <a:pPr marL="0" lvl="0" indent="0" algn="ctr" defTabSz="577850">
+          <a:pPr marL="0" lvl="0" indent="0" algn="ctr" defTabSz="622300">
             <a:lnSpc>
               <a:spcPct val="90000"/>
             </a:lnSpc>
@@ -9403,12 +9410,12 @@
             </a:spcAft>
             <a:buNone/>
           </a:pPr>
-          <a:endParaRPr lang="en-US" sz="1300" kern="1200"/>
+          <a:endParaRPr lang="en-US" sz="1400" kern="1200"/>
         </a:p>
       </dsp:txBody>
       <dsp:txXfrm>
-        <a:off x="1472747" y="1251973"/>
-        <a:ext cx="198106" cy="198640"/>
+        <a:off x="1615694" y="1242403"/>
+        <a:ext cx="217195" cy="217780"/>
       </dsp:txXfrm>
     </dsp:sp>
     <dsp:sp modelId="{6D67AE28-6B95-4EA2-9047-BC6EEDCD4178}">
@@ -9418,8 +9425,8 @@
       </dsp:nvSpPr>
       <dsp:spPr>
         <a:xfrm>
-          <a:off x="1873231" y="525491"/>
-          <a:ext cx="1334946" cy="1651604"/>
+          <a:off x="2054769" y="461643"/>
+          <a:ext cx="1463581" cy="1779300"/>
         </a:xfrm>
         <a:prstGeom prst="roundRect">
           <a:avLst>
@@ -9463,12 +9470,12 @@
         </a:fontRef>
       </dsp:style>
       <dsp:txBody>
-        <a:bodyPr spcFirstLastPara="0" vert="horz" wrap="square" lIns="60960" tIns="60960" rIns="60960" bIns="60960" numCol="1" spcCol="1270" anchor="ctr" anchorCtr="0">
+        <a:bodyPr spcFirstLastPara="0" vert="horz" wrap="square" lIns="64770" tIns="64770" rIns="64770" bIns="64770" numCol="1" spcCol="1270" anchor="ctr" anchorCtr="0">
           <a:noAutofit/>
         </a:bodyPr>
         <a:lstStyle/>
         <a:p>
-          <a:pPr marL="0" lvl="0" indent="0" algn="ctr" defTabSz="711200">
+          <a:pPr marL="0" lvl="0" indent="0" algn="ctr" defTabSz="755650">
             <a:lnSpc>
               <a:spcPct val="90000"/>
             </a:lnSpc>
@@ -9481,15 +9488,15 @@
             <a:buNone/>
           </a:pPr>
           <a:r>
-            <a:rPr lang="en-US" sz="1600" b="1" kern="1200" dirty="0"/>
+            <a:rPr lang="en-US" sz="1700" b="1" kern="1200" dirty="0"/>
             <a:t>Two options write to event logs</a:t>
           </a:r>
-          <a:endParaRPr lang="en-US" sz="1600" kern="1200" dirty="0"/>
+          <a:endParaRPr lang="en-US" sz="1700" kern="1200" dirty="0"/>
         </a:p>
       </dsp:txBody>
       <dsp:txXfrm>
-        <a:off x="1912330" y="564590"/>
-        <a:ext cx="1256748" cy="1573406"/>
+        <a:off x="2097636" y="504510"/>
+        <a:ext cx="1377847" cy="1693566"/>
       </dsp:txXfrm>
     </dsp:sp>
     <dsp:sp modelId="{79C55D41-E5AC-439C-B991-9E34E63C9561}">
@@ -9499,8 +9506,8 @@
       </dsp:nvSpPr>
       <dsp:spPr>
         <a:xfrm>
-          <a:off x="3341671" y="1185760"/>
-          <a:ext cx="283008" cy="331066"/>
+          <a:off x="3664709" y="1169809"/>
+          <a:ext cx="310279" cy="362968"/>
         </a:xfrm>
         <a:prstGeom prst="rightArrow">
           <a:avLst>
@@ -9542,7 +9549,7 @@
         </a:bodyPr>
         <a:lstStyle/>
         <a:p>
-          <a:pPr marL="0" lvl="0" indent="0" algn="ctr" defTabSz="577850">
+          <a:pPr marL="0" lvl="0" indent="0" algn="ctr" defTabSz="622300">
             <a:lnSpc>
               <a:spcPct val="90000"/>
             </a:lnSpc>
@@ -9554,12 +9561,12 @@
             </a:spcAft>
             <a:buNone/>
           </a:pPr>
-          <a:endParaRPr lang="en-US" sz="1300" kern="1200"/>
+          <a:endParaRPr lang="en-US" sz="1400" kern="1200"/>
         </a:p>
       </dsp:txBody>
       <dsp:txXfrm>
-        <a:off x="3341671" y="1251973"/>
-        <a:ext cx="198106" cy="198640"/>
+        <a:off x="3664709" y="1242403"/>
+        <a:ext cx="217195" cy="217780"/>
       </dsp:txXfrm>
     </dsp:sp>
     <dsp:sp modelId="{BE95DEB1-1111-461E-94AD-C14F6FDA2ED3}">
@@ -9569,8 +9576,8 @@
       </dsp:nvSpPr>
       <dsp:spPr>
         <a:xfrm>
-          <a:off x="3742155" y="525491"/>
-          <a:ext cx="1334946" cy="1651604"/>
+          <a:off x="4103783" y="461643"/>
+          <a:ext cx="1463581" cy="1779300"/>
         </a:xfrm>
         <a:prstGeom prst="roundRect">
           <a:avLst>
@@ -9614,12 +9621,12 @@
         </a:fontRef>
       </dsp:style>
       <dsp:txBody>
-        <a:bodyPr spcFirstLastPara="0" vert="horz" wrap="square" lIns="60960" tIns="60960" rIns="60960" bIns="60960" numCol="1" spcCol="1270" anchor="ctr" anchorCtr="0">
+        <a:bodyPr spcFirstLastPara="0" vert="horz" wrap="square" lIns="64770" tIns="64770" rIns="64770" bIns="64770" numCol="1" spcCol="1270" anchor="ctr" anchorCtr="0">
           <a:noAutofit/>
         </a:bodyPr>
         <a:lstStyle/>
         <a:p>
-          <a:pPr marL="0" lvl="0" indent="0" algn="ctr" defTabSz="711200">
+          <a:pPr marL="0" lvl="0" indent="0" algn="ctr" defTabSz="755650">
             <a:lnSpc>
               <a:spcPct val="90000"/>
             </a:lnSpc>
@@ -9632,15 +9639,15 @@
             <a:buNone/>
           </a:pPr>
           <a:r>
-            <a:rPr lang="en-US" sz="1600" b="1" kern="1200" dirty="0"/>
+            <a:rPr lang="en-US" sz="1700" b="1" kern="1200" dirty="0"/>
             <a:t>Transcription produces flat text files</a:t>
           </a:r>
-          <a:endParaRPr lang="en-US" sz="1600" kern="1200" dirty="0"/>
+          <a:endParaRPr lang="en-US" sz="1700" kern="1200" dirty="0"/>
         </a:p>
       </dsp:txBody>
       <dsp:txXfrm>
-        <a:off x="3781254" y="564590"/>
-        <a:ext cx="1256748" cy="1573406"/>
+        <a:off x="4146650" y="504510"/>
+        <a:ext cx="1377847" cy="1693566"/>
       </dsp:txXfrm>
     </dsp:sp>
     <dsp:sp modelId="{66815C73-8A07-422F-965F-0101AF524FB2}">
@@ -9650,8 +9657,8 @@
       </dsp:nvSpPr>
       <dsp:spPr>
         <a:xfrm>
-          <a:off x="5210596" y="1185760"/>
-          <a:ext cx="283008" cy="331066"/>
+          <a:off x="5713723" y="1169809"/>
+          <a:ext cx="310279" cy="362968"/>
         </a:xfrm>
         <a:prstGeom prst="rightArrow">
           <a:avLst>
@@ -9693,7 +9700,7 @@
         </a:bodyPr>
         <a:lstStyle/>
         <a:p>
-          <a:pPr marL="0" lvl="0" indent="0" algn="ctr" defTabSz="577850">
+          <a:pPr marL="0" lvl="0" indent="0" algn="ctr" defTabSz="622300">
             <a:lnSpc>
               <a:spcPct val="90000"/>
             </a:lnSpc>
@@ -9705,12 +9712,12 @@
             </a:spcAft>
             <a:buNone/>
           </a:pPr>
-          <a:endParaRPr lang="en-US" sz="1300" kern="1200"/>
+          <a:endParaRPr lang="en-US" sz="1400" kern="1200"/>
         </a:p>
       </dsp:txBody>
       <dsp:txXfrm>
-        <a:off x="5210596" y="1251973"/>
-        <a:ext cx="198106" cy="198640"/>
+        <a:off x="5713723" y="1242403"/>
+        <a:ext cx="217195" cy="217780"/>
       </dsp:txXfrm>
     </dsp:sp>
     <dsp:sp modelId="{7EBA245D-D6D0-48E5-862A-F51D0CB74C5E}">
@@ -9720,8 +9727,8 @@
       </dsp:nvSpPr>
       <dsp:spPr>
         <a:xfrm>
-          <a:off x="5611080" y="525491"/>
-          <a:ext cx="1334946" cy="1651604"/>
+          <a:off x="6152798" y="461643"/>
+          <a:ext cx="1800498" cy="1779300"/>
         </a:xfrm>
         <a:prstGeom prst="roundRect">
           <a:avLst>
@@ -9765,12 +9772,12 @@
         </a:fontRef>
       </dsp:style>
       <dsp:txBody>
-        <a:bodyPr spcFirstLastPara="0" vert="horz" wrap="square" lIns="60960" tIns="60960" rIns="60960" bIns="60960" numCol="1" spcCol="1270" anchor="ctr" anchorCtr="0">
+        <a:bodyPr spcFirstLastPara="0" vert="horz" wrap="square" lIns="64770" tIns="64770" rIns="64770" bIns="64770" numCol="1" spcCol="1270" anchor="ctr" anchorCtr="0">
           <a:noAutofit/>
         </a:bodyPr>
         <a:lstStyle/>
         <a:p>
-          <a:pPr marL="0" lvl="0" indent="0" algn="ctr" defTabSz="711200">
+          <a:pPr marL="0" lvl="0" indent="0" algn="ctr" defTabSz="755650">
             <a:lnSpc>
               <a:spcPct val="90000"/>
             </a:lnSpc>
@@ -9783,23 +9790,30 @@
             <a:buNone/>
           </a:pPr>
           <a:r>
-            <a:rPr lang="en-US" sz="1600" b="1" kern="1200" dirty="0"/>
-            <a:t>Logging can fill you the </a:t>
+            <a:rPr lang="en-US" sz="1700" b="1" kern="1200" dirty="0"/>
+            <a:t>Logging can fill up the </a:t>
           </a:r>
           <a:r>
-            <a:rPr lang="en-US" sz="1600" b="1" kern="1200" dirty="0" err="1"/>
+            <a:rPr lang="en-US" sz="1700" b="1" kern="1200" dirty="0" err="1"/>
             <a:t>eventlog</a:t>
           </a:r>
           <a:r>
-            <a:rPr lang="en-US" sz="1600" b="1" kern="1200" dirty="0"/>
-            <a:t> , so increase you log size to 1GB if possible</a:t>
+            <a:rPr lang="en-US" sz="1700" b="1" kern="1200" dirty="0"/>
+            <a:t> quickly. </a:t>
           </a:r>
-          <a:endParaRPr lang="en-US" sz="1600" kern="1200" dirty="0"/>
+          <a:br>
+            <a:rPr lang="en-US" sz="1700" b="1" kern="1200" dirty="0"/>
+          </a:br>
+          <a:r>
+            <a:rPr lang="en-US" sz="1700" b="1" kern="1200" dirty="0"/>
+            <a:t>Increase log size to 1GB +if possible</a:t>
+          </a:r>
+          <a:endParaRPr lang="en-US" sz="1700" kern="1200" dirty="0"/>
         </a:p>
       </dsp:txBody>
       <dsp:txXfrm>
-        <a:off x="5650179" y="564590"/>
-        <a:ext cx="1256748" cy="1573406"/>
+        <a:off x="6204912" y="513757"/>
+        <a:ext cx="1696270" cy="1675072"/>
       </dsp:txXfrm>
     </dsp:sp>
     <dsp:sp modelId="{CEE6FE93-928F-4743-A142-BB37F7A51004}">
@@ -9809,8 +9823,8 @@
       </dsp:nvSpPr>
       <dsp:spPr>
         <a:xfrm>
-          <a:off x="7079521" y="1185760"/>
-          <a:ext cx="283008" cy="331066"/>
+          <a:off x="8099655" y="1169809"/>
+          <a:ext cx="310279" cy="362968"/>
         </a:xfrm>
         <a:prstGeom prst="rightArrow">
           <a:avLst>
@@ -9852,7 +9866,7 @@
         </a:bodyPr>
         <a:lstStyle/>
         <a:p>
-          <a:pPr marL="0" lvl="0" indent="0" algn="ctr" defTabSz="577850">
+          <a:pPr marL="0" lvl="0" indent="0" algn="ctr" defTabSz="622300">
             <a:lnSpc>
               <a:spcPct val="90000"/>
             </a:lnSpc>
@@ -9864,12 +9878,12 @@
             </a:spcAft>
             <a:buNone/>
           </a:pPr>
-          <a:endParaRPr lang="en-US" sz="1300" kern="1200"/>
+          <a:endParaRPr lang="en-US" sz="1400" kern="1200"/>
         </a:p>
       </dsp:txBody>
       <dsp:txXfrm>
-        <a:off x="7079521" y="1251973"/>
-        <a:ext cx="198106" cy="198640"/>
+        <a:off x="8099655" y="1242403"/>
+        <a:ext cx="217195" cy="217780"/>
       </dsp:txXfrm>
     </dsp:sp>
     <dsp:sp modelId="{B40405FA-C33E-41D5-83A9-772FCB8F754D}">
@@ -9879,8 +9893,8 @@
       </dsp:nvSpPr>
       <dsp:spPr>
         <a:xfrm>
-          <a:off x="7480005" y="525491"/>
-          <a:ext cx="1334946" cy="1651604"/>
+          <a:off x="8538729" y="461643"/>
+          <a:ext cx="1463581" cy="1779300"/>
         </a:xfrm>
         <a:prstGeom prst="roundRect">
           <a:avLst>
@@ -9924,12 +9938,12 @@
         </a:fontRef>
       </dsp:style>
       <dsp:txBody>
-        <a:bodyPr spcFirstLastPara="0" vert="horz" wrap="square" lIns="60960" tIns="60960" rIns="60960" bIns="60960" numCol="1" spcCol="1270" anchor="ctr" anchorCtr="0">
+        <a:bodyPr spcFirstLastPara="0" vert="horz" wrap="square" lIns="64770" tIns="64770" rIns="64770" bIns="64770" numCol="1" spcCol="1270" anchor="ctr" anchorCtr="0">
           <a:noAutofit/>
         </a:bodyPr>
         <a:lstStyle/>
         <a:p>
-          <a:pPr marL="0" lvl="0" indent="0" algn="ctr" defTabSz="711200">
+          <a:pPr marL="0" lvl="0" indent="0" algn="ctr" defTabSz="755650">
             <a:lnSpc>
               <a:spcPct val="90000"/>
             </a:lnSpc>
@@ -9942,15 +9956,15 @@
             <a:buNone/>
           </a:pPr>
           <a:r>
-            <a:rPr lang="en-US" sz="1600" b="1" kern="1200" dirty="0"/>
+            <a:rPr lang="en-US" sz="1700" b="1" kern="1200" dirty="0"/>
             <a:t>The right combination of logging is determined by you</a:t>
           </a:r>
-          <a:endParaRPr lang="en-US" sz="1600" kern="1200" dirty="0"/>
+          <a:endParaRPr lang="en-US" sz="1700" kern="1200" dirty="0"/>
         </a:p>
       </dsp:txBody>
       <dsp:txXfrm>
-        <a:off x="7519104" y="564590"/>
-        <a:ext cx="1256748" cy="1573406"/>
+        <a:off x="8581596" y="504510"/>
+        <a:ext cx="1377847" cy="1693566"/>
       </dsp:txXfrm>
     </dsp:sp>
   </dsp:spTree>
@@ -20013,7 +20027,7 @@
           <a:p>
             <a:fld id="{ECD19FB2-3AAB-4D03-B13A-2960828C78E3}" type="datetimeFigureOut">
               <a:rPr lang="en-US" smtClean="0"/>
-              <a:t>8/4/2019</a:t>
+              <a:t>8/5/2019</a:t>
             </a:fld>
             <a:endParaRPr lang="en-US" dirty="0"/>
           </a:p>
@@ -20450,7 +20464,7 @@
           <a:p>
             <a:fld id="{1B80C674-7DFC-42FE-B9CD-82963CDB1557}" type="datetimeFigureOut">
               <a:rPr lang="en-US" smtClean="0"/>
-              <a:t>8/4/2019</a:t>
+              <a:t>8/5/2019</a:t>
             </a:fld>
             <a:endParaRPr lang="en-US" dirty="0"/>
           </a:p>
@@ -20700,7 +20714,7 @@
           <a:p>
             <a:fld id="{2076456F-F47D-4F25-8053-2A695DA0CA7D}" type="datetimeFigureOut">
               <a:rPr lang="en-US" smtClean="0"/>
-              <a:t>8/4/2019</a:t>
+              <a:t>8/5/2019</a:t>
             </a:fld>
             <a:endParaRPr lang="en-US" dirty="0"/>
           </a:p>
@@ -21008,7 +21022,7 @@
           <a:p>
             <a:fld id="{5D6C7379-69CC-4837-9905-BEBA22830C8A}" type="datetimeFigureOut">
               <a:rPr lang="en-US" smtClean="0"/>
-              <a:t>8/4/2019</a:t>
+              <a:t>8/5/2019</a:t>
             </a:fld>
             <a:endParaRPr lang="en-US" dirty="0"/>
           </a:p>
@@ -21326,7 +21340,7 @@
           <a:p>
             <a:fld id="{49EB8B7E-8AEE-4F10-BFEE-C999AD004D36}" type="datetimeFigureOut">
               <a:rPr lang="en-US" smtClean="0"/>
-              <a:t>8/4/2019</a:t>
+              <a:t>8/5/2019</a:t>
             </a:fld>
             <a:endParaRPr lang="en-US" dirty="0"/>
           </a:p>
@@ -21628,7 +21642,7 @@
           <a:p>
             <a:fld id="{51CF1133-3259-4C45-BABA-5B62D9C6F78D}" type="datetimeFigureOut">
               <a:rPr lang="en-US" smtClean="0"/>
-              <a:t>8/4/2019</a:t>
+              <a:t>8/5/2019</a:t>
             </a:fld>
             <a:endParaRPr lang="en-US" dirty="0"/>
           </a:p>
@@ -21997,7 +22011,7 @@
           <a:p>
             <a:fld id="{51CF1133-3259-4C45-BABA-5B62D9C6F78D}" type="datetimeFigureOut">
               <a:rPr lang="en-US" smtClean="0"/>
-              <a:t>8/4/2019</a:t>
+              <a:t>8/5/2019</a:t>
             </a:fld>
             <a:endParaRPr lang="en-US" dirty="0"/>
           </a:p>
@@ -22173,7 +22187,7 @@
           <a:p>
             <a:fld id="{0DED02AE-B9A4-47BD-AF8E-97E16144138B}" type="datetimeFigureOut">
               <a:rPr lang="en-US" smtClean="0"/>
-              <a:t>8/4/2019</a:t>
+              <a:t>8/5/2019</a:t>
             </a:fld>
             <a:endParaRPr lang="en-US" dirty="0"/>
           </a:p>
@@ -22353,7 +22367,7 @@
           <a:p>
             <a:fld id="{CF0FD78B-DB02-4362-BCDC-98A55456977C}" type="datetimeFigureOut">
               <a:rPr lang="en-US" smtClean="0"/>
-              <a:t>8/4/2019</a:t>
+              <a:t>8/5/2019</a:t>
             </a:fld>
             <a:endParaRPr lang="en-US" dirty="0"/>
           </a:p>
@@ -22523,7 +22537,7 @@
           <a:p>
             <a:fld id="{99916976-5D93-46E4-A98A-FAD63E4D0EA8}" type="datetimeFigureOut">
               <a:rPr lang="en-US" smtClean="0"/>
-              <a:t>8/4/2019</a:t>
+              <a:t>8/5/2019</a:t>
             </a:fld>
             <a:endParaRPr lang="en-US" dirty="0"/>
           </a:p>
@@ -22773,7 +22787,7 @@
           <a:p>
             <a:fld id="{0F39F4F5-F4D2-4D2A-AB60-88D37ADCB869}" type="datetimeFigureOut">
               <a:rPr lang="en-US" smtClean="0"/>
-              <a:t>8/4/2019</a:t>
+              <a:t>8/5/2019</a:t>
             </a:fld>
             <a:endParaRPr lang="en-US" dirty="0"/>
           </a:p>
@@ -23009,7 +23023,7 @@
           <a:p>
             <a:fld id="{D23BC6CE-6D1E-47E5-8859-F31AC5380EB2}" type="datetimeFigureOut">
               <a:rPr lang="en-US" smtClean="0"/>
-              <a:t>8/4/2019</a:t>
+              <a:t>8/5/2019</a:t>
             </a:fld>
             <a:endParaRPr lang="en-US" dirty="0"/>
           </a:p>
@@ -23391,7 +23405,7 @@
           <a:p>
             <a:fld id="{B1B4E7C4-4DA4-404D-9965-B13F2DD7D8BF}" type="datetimeFigureOut">
               <a:rPr lang="en-US" smtClean="0"/>
-              <a:t>8/4/2019</a:t>
+              <a:t>8/5/2019</a:t>
             </a:fld>
             <a:endParaRPr lang="en-US" dirty="0"/>
           </a:p>
@@ -23509,7 +23523,7 @@
           <a:p>
             <a:fld id="{476FB7AA-4A53-424F-AD41-70827B6504BA}" type="datetimeFigureOut">
               <a:rPr lang="en-US" smtClean="0"/>
-              <a:t>8/4/2019</a:t>
+              <a:t>8/5/2019</a:t>
             </a:fld>
             <a:endParaRPr lang="en-US" dirty="0"/>
           </a:p>
@@ -23604,7 +23618,7 @@
           <a:p>
             <a:fld id="{E7884882-FB12-4BC8-9960-9AD8104D7FAE}" type="datetimeFigureOut">
               <a:rPr lang="en-US" smtClean="0"/>
-              <a:t>8/4/2019</a:t>
+              <a:t>8/5/2019</a:t>
             </a:fld>
             <a:endParaRPr lang="en-US" dirty="0"/>
           </a:p>
@@ -23859,7 +23873,7 @@
           <a:p>
             <a:fld id="{F7D1BD23-6E54-4D9D-AD88-A2813C73CC25}" type="datetimeFigureOut">
               <a:rPr lang="en-US" smtClean="0"/>
-              <a:t>8/4/2019</a:t>
+              <a:t>8/5/2019</a:t>
             </a:fld>
             <a:endParaRPr lang="en-US" dirty="0"/>
           </a:p>
@@ -24142,7 +24156,7 @@
           <a:p>
             <a:fld id="{1471A834-4F3C-4AF9-9C74-05EC35A0F292}" type="datetimeFigureOut">
               <a:rPr lang="en-US" smtClean="0"/>
-              <a:t>8/4/2019</a:t>
+              <a:t>8/5/2019</a:t>
             </a:fld>
             <a:endParaRPr lang="en-US" dirty="0"/>
           </a:p>
@@ -24548,7 +24562,7 @@
           <a:p>
             <a:fld id="{51CF1133-3259-4C45-BABA-5B62D9C6F78D}" type="datetimeFigureOut">
               <a:rPr lang="en-US" smtClean="0"/>
-              <a:t>8/4/2019</a:t>
+              <a:t>8/5/2019</a:t>
             </a:fld>
             <a:endParaRPr lang="en-US" dirty="0"/>
           </a:p>
@@ -25292,13 +25306,13 @@
   <p:clrMapOvr>
     <a:masterClrMapping/>
   </p:clrMapOvr>
-  <mc:AlternateContent xmlns:mc="http://schemas.openxmlformats.org/markup-compatibility/2006">
-    <mc:Choice xmlns:p159="http://schemas.microsoft.com/office/powerpoint/2015/09/main" Requires="p159">
+  <mc:AlternateContent xmlns:mc="http://schemas.openxmlformats.org/markup-compatibility/2006" xmlns:p159="http://schemas.microsoft.com/office/powerpoint/2015/09/main">
+    <mc:Choice Requires="p159">
       <p:transition xmlns:p14="http://schemas.microsoft.com/office/powerpoint/2010/main" spd="slow" p14:dur="2000">
         <p159:morph option="byObject"/>
       </p:transition>
     </mc:Choice>
-    <mc:Fallback>
+    <mc:Fallback xmlns="">
       <p:transition spd="slow">
         <p:fade/>
       </p:transition>
@@ -29526,13 +29540,13 @@
   <p:clrMapOvr>
     <a:masterClrMapping/>
   </p:clrMapOvr>
-  <mc:AlternateContent xmlns:mc="http://schemas.openxmlformats.org/markup-compatibility/2006">
-    <mc:Choice xmlns:p14="http://schemas.microsoft.com/office/powerpoint/2010/main" Requires="p14">
+  <mc:AlternateContent xmlns:mc="http://schemas.openxmlformats.org/markup-compatibility/2006" xmlns:p14="http://schemas.microsoft.com/office/powerpoint/2010/main">
+    <mc:Choice Requires="p14">
       <p:transition spd="slow" p14:dur="3900">
         <p14:glitter pattern="hexagon"/>
       </p:transition>
     </mc:Choice>
-    <mc:Fallback>
+    <mc:Fallback xmlns="">
       <p:transition spd="slow">
         <p:fade/>
       </p:transition>
@@ -29809,13 +29823,13 @@
   <p:clrMapOvr>
     <a:masterClrMapping/>
   </p:clrMapOvr>
-  <mc:AlternateContent xmlns:mc="http://schemas.openxmlformats.org/markup-compatibility/2006">
-    <mc:Choice xmlns:p14="http://schemas.microsoft.com/office/powerpoint/2010/main" Requires="p14">
+  <mc:AlternateContent xmlns:mc="http://schemas.openxmlformats.org/markup-compatibility/2006" xmlns:p14="http://schemas.microsoft.com/office/powerpoint/2010/main">
+    <mc:Choice Requires="p14">
       <p:transition spd="slow" p14:dur="2500">
         <p:checker/>
       </p:transition>
     </mc:Choice>
-    <mc:Fallback>
+    <mc:Fallback xmlns="">
       <p:transition spd="slow">
         <p:checker/>
       </p:transition>
@@ -30483,13 +30497,13 @@
   <p:clrMapOvr>
     <a:masterClrMapping/>
   </p:clrMapOvr>
-  <mc:AlternateContent xmlns:mc="http://schemas.openxmlformats.org/markup-compatibility/2006">
-    <mc:Choice xmlns:p14="http://schemas.microsoft.com/office/powerpoint/2010/main" Requires="p14">
+  <mc:AlternateContent xmlns:mc="http://schemas.openxmlformats.org/markup-compatibility/2006" xmlns:p14="http://schemas.microsoft.com/office/powerpoint/2010/main">
+    <mc:Choice Requires="p14">
       <p:transition spd="med" p14:dur="700">
         <p:fade/>
       </p:transition>
     </mc:Choice>
-    <mc:Fallback>
+    <mc:Fallback xmlns="">
       <p:transition spd="med">
         <p:fade/>
       </p:transition>
@@ -31420,13 +31434,13 @@
   <p:clrMapOvr>
     <a:masterClrMapping/>
   </p:clrMapOvr>
-  <mc:AlternateContent xmlns:mc="http://schemas.openxmlformats.org/markup-compatibility/2006">
-    <mc:Choice xmlns:p14="http://schemas.microsoft.com/office/powerpoint/2010/main" Requires="p14">
+  <mc:AlternateContent xmlns:mc="http://schemas.openxmlformats.org/markup-compatibility/2006" xmlns:p14="http://schemas.microsoft.com/office/powerpoint/2010/main">
+    <mc:Choice Requires="p14">
       <p:transition spd="med" p14:dur="700">
         <p:fade/>
       </p:transition>
     </mc:Choice>
-    <mc:Fallback>
+    <mc:Fallback xmlns="">
       <p:transition spd="med">
         <p:fade/>
       </p:transition>
@@ -32219,13 +32233,13 @@
   <p:clrMapOvr>
     <a:masterClrMapping/>
   </p:clrMapOvr>
-  <mc:AlternateContent xmlns:mc="http://schemas.openxmlformats.org/markup-compatibility/2006">
-    <mc:Choice xmlns:p14="http://schemas.microsoft.com/office/powerpoint/2010/main" Requires="p14">
+  <mc:AlternateContent xmlns:mc="http://schemas.openxmlformats.org/markup-compatibility/2006" xmlns:p14="http://schemas.microsoft.com/office/powerpoint/2010/main">
+    <mc:Choice Requires="p14">
       <p:transition spd="slow" p14:dur="3900">
         <p14:glitter pattern="hexagon"/>
       </p:transition>
     </mc:Choice>
-    <mc:Fallback>
+    <mc:Fallback xmlns="">
       <p:transition spd="slow">
         <p:fade/>
       </p:transition>
@@ -32326,13 +32340,13 @@
   <p:clrMapOvr>
     <a:masterClrMapping/>
   </p:clrMapOvr>
-  <mc:AlternateContent xmlns:mc="http://schemas.openxmlformats.org/markup-compatibility/2006">
-    <mc:Choice xmlns:p14="http://schemas.microsoft.com/office/powerpoint/2010/main" Requires="p14">
+  <mc:AlternateContent xmlns:mc="http://schemas.openxmlformats.org/markup-compatibility/2006" xmlns:p14="http://schemas.microsoft.com/office/powerpoint/2010/main">
+    <mc:Choice Requires="p14">
       <p:transition spd="slow" p14:dur="2500">
         <p:checker/>
       </p:transition>
     </mc:Choice>
-    <mc:Fallback>
+    <mc:Fallback xmlns="">
       <p:transition spd="slow">
         <p:checker/>
       </p:transition>
@@ -32498,13 +32512,13 @@
   <p:clrMapOvr>
     <a:masterClrMapping/>
   </p:clrMapOvr>
-  <mc:AlternateContent xmlns:mc="http://schemas.openxmlformats.org/markup-compatibility/2006">
-    <mc:Choice xmlns:p14="http://schemas.microsoft.com/office/powerpoint/2010/main" Requires="p14">
+  <mc:AlternateContent xmlns:mc="http://schemas.openxmlformats.org/markup-compatibility/2006" xmlns:p14="http://schemas.microsoft.com/office/powerpoint/2010/main">
+    <mc:Choice Requires="p14">
       <p:transition spd="slow" p14:dur="2500">
         <p:checker/>
       </p:transition>
     </mc:Choice>
-    <mc:Fallback>
+    <mc:Fallback xmlns="">
       <p:transition spd="slow">
         <p:checker/>
       </p:transition>
@@ -32670,13 +32684,13 @@
   <p:clrMapOvr>
     <a:masterClrMapping/>
   </p:clrMapOvr>
-  <mc:AlternateContent xmlns:mc="http://schemas.openxmlformats.org/markup-compatibility/2006">
-    <mc:Choice xmlns:p14="http://schemas.microsoft.com/office/powerpoint/2010/main" Requires="p14">
+  <mc:AlternateContent xmlns:mc="http://schemas.openxmlformats.org/markup-compatibility/2006" xmlns:p14="http://schemas.microsoft.com/office/powerpoint/2010/main">
+    <mc:Choice Requires="p14">
       <p:transition spd="slow" p14:dur="2500">
         <p:checker/>
       </p:transition>
     </mc:Choice>
-    <mc:Fallback>
+    <mc:Fallback xmlns="">
       <p:transition spd="slow">
         <p:checker/>
       </p:transition>
@@ -32857,13 +32871,13 @@
   <p:clrMapOvr>
     <a:masterClrMapping/>
   </p:clrMapOvr>
-  <mc:AlternateContent xmlns:mc="http://schemas.openxmlformats.org/markup-compatibility/2006">
-    <mc:Choice xmlns:p14="http://schemas.microsoft.com/office/powerpoint/2010/main" Requires="p14">
+  <mc:AlternateContent xmlns:mc="http://schemas.openxmlformats.org/markup-compatibility/2006" xmlns:p14="http://schemas.microsoft.com/office/powerpoint/2010/main">
+    <mc:Choice Requires="p14">
       <p:transition spd="slow" p14:dur="4000">
         <p14:vortex dir="r"/>
       </p:transition>
     </mc:Choice>
-    <mc:Fallback>
+    <mc:Fallback xmlns="">
       <p:transition spd="slow">
         <p:fade/>
       </p:transition>
@@ -33677,13 +33691,13 @@
   <p:clrMapOvr>
     <a:masterClrMapping/>
   </p:clrMapOvr>
-  <mc:AlternateContent xmlns:mc="http://schemas.openxmlformats.org/markup-compatibility/2006">
-    <mc:Choice xmlns:p14="http://schemas.microsoft.com/office/powerpoint/2010/main" Requires="p14">
+  <mc:AlternateContent xmlns:mc="http://schemas.openxmlformats.org/markup-compatibility/2006" xmlns:p14="http://schemas.microsoft.com/office/powerpoint/2010/main">
+    <mc:Choice Requires="p14">
       <p:transition spd="slow" p14:dur="2500">
         <p:checker/>
       </p:transition>
     </mc:Choice>
-    <mc:Fallback>
+    <mc:Fallback xmlns="">
       <p:transition spd="slow">
         <p:checker/>
       </p:transition>
@@ -33832,13 +33846,13 @@
   <p:clrMapOvr>
     <a:masterClrMapping/>
   </p:clrMapOvr>
-  <mc:AlternateContent xmlns:mc="http://schemas.openxmlformats.org/markup-compatibility/2006">
-    <mc:Choice xmlns:p14="http://schemas.microsoft.com/office/powerpoint/2010/main" Requires="p14">
+  <mc:AlternateContent xmlns:mc="http://schemas.openxmlformats.org/markup-compatibility/2006" xmlns:p14="http://schemas.microsoft.com/office/powerpoint/2010/main">
+    <mc:Choice Requires="p14">
       <p:transition spd="slow" p14:dur="2500">
         <p:checker/>
       </p:transition>
     </mc:Choice>
-    <mc:Fallback>
+    <mc:Fallback xmlns="">
       <p:transition spd="slow">
         <p:checker/>
       </p:transition>
@@ -34003,13 +34017,13 @@
   <p:clrMapOvr>
     <a:masterClrMapping/>
   </p:clrMapOvr>
-  <mc:AlternateContent xmlns:mc="http://schemas.openxmlformats.org/markup-compatibility/2006">
-    <mc:Choice xmlns:p14="http://schemas.microsoft.com/office/powerpoint/2010/main" Requires="p14">
+  <mc:AlternateContent xmlns:mc="http://schemas.openxmlformats.org/markup-compatibility/2006" xmlns:p14="http://schemas.microsoft.com/office/powerpoint/2010/main">
+    <mc:Choice Requires="p14">
       <p:transition spd="slow" p14:dur="2500">
         <p:checker/>
       </p:transition>
     </mc:Choice>
-    <mc:Fallback>
+    <mc:Fallback xmlns="">
       <p:transition spd="slow">
         <p:checker/>
       </p:transition>
@@ -34141,13 +34155,13 @@
   <p:clrMapOvr>
     <a:masterClrMapping/>
   </p:clrMapOvr>
-  <mc:AlternateContent xmlns:mc="http://schemas.openxmlformats.org/markup-compatibility/2006">
-    <mc:Choice xmlns:p14="http://schemas.microsoft.com/office/powerpoint/2010/main" Requires="p14">
+  <mc:AlternateContent xmlns:mc="http://schemas.openxmlformats.org/markup-compatibility/2006" xmlns:p14="http://schemas.microsoft.com/office/powerpoint/2010/main">
+    <mc:Choice Requires="p14">
       <p:transition spd="slow" p14:dur="2500">
         <p:checker/>
       </p:transition>
     </mc:Choice>
-    <mc:Fallback>
+    <mc:Fallback xmlns="">
       <p:transition spd="slow">
         <p:checker/>
       </p:transition>
@@ -34157,7 +34171,7 @@
 </file>
 
 <file path=ppt/slides/slide24.xml><?xml version="1.0" encoding="utf-8"?>
-<p:sld xmlns:a="http://schemas.openxmlformats.org/drawingml/2006/main" xmlns:r="http://schemas.openxmlformats.org/officeDocument/2006/relationships" xmlns:p="http://schemas.openxmlformats.org/presentationml/2006/main">
+<p:sld xmlns:a="http://schemas.openxmlformats.org/drawingml/2006/main" xmlns:r="http://schemas.openxmlformats.org/officeDocument/2006/relationships" xmlns:p="http://schemas.openxmlformats.org/presentationml/2006/main" show="0">
   <p:cSld>
     <p:spTree>
       <p:nvGrpSpPr>
@@ -34391,13 +34405,13 @@
   <p:clrMapOvr>
     <a:masterClrMapping/>
   </p:clrMapOvr>
-  <mc:AlternateContent xmlns:mc="http://schemas.openxmlformats.org/markup-compatibility/2006">
-    <mc:Choice xmlns:p14="http://schemas.microsoft.com/office/powerpoint/2010/main" Requires="p14">
+  <mc:AlternateContent xmlns:mc="http://schemas.openxmlformats.org/markup-compatibility/2006" xmlns:p14="http://schemas.microsoft.com/office/powerpoint/2010/main">
+    <mc:Choice Requires="p14">
       <p:transition spd="slow" p14:dur="3900">
         <p14:glitter pattern="hexagon"/>
       </p:transition>
     </mc:Choice>
-    <mc:Fallback>
+    <mc:Fallback xmlns="">
       <p:transition spd="slow">
         <p:fade/>
       </p:transition>
@@ -34509,13 +34523,13 @@
   <p:clrMapOvr>
     <a:masterClrMapping/>
   </p:clrMapOvr>
-  <mc:AlternateContent xmlns:mc="http://schemas.openxmlformats.org/markup-compatibility/2006">
-    <mc:Choice xmlns:p14="http://schemas.microsoft.com/office/powerpoint/2010/main" Requires="p14">
+  <mc:AlternateContent xmlns:mc="http://schemas.openxmlformats.org/markup-compatibility/2006" xmlns:p14="http://schemas.microsoft.com/office/powerpoint/2010/main">
+    <mc:Choice Requires="p14">
       <p:transition spd="slow" p14:dur="1600">
         <p:blinds dir="vert"/>
       </p:transition>
     </mc:Choice>
-    <mc:Fallback>
+    <mc:Fallback xmlns="">
       <p:transition spd="slow">
         <p:blinds dir="vert"/>
       </p:transition>
@@ -34713,13 +34727,13 @@
   <p:clrMapOvr>
     <a:masterClrMapping/>
   </p:clrMapOvr>
-  <mc:AlternateContent xmlns:mc="http://schemas.openxmlformats.org/markup-compatibility/2006">
-    <mc:Choice xmlns:p14="http://schemas.microsoft.com/office/powerpoint/2010/main" Requires="p14">
+  <mc:AlternateContent xmlns:mc="http://schemas.openxmlformats.org/markup-compatibility/2006" xmlns:p14="http://schemas.microsoft.com/office/powerpoint/2010/main">
+    <mc:Choice Requires="p14">
       <p:transition spd="slow" p14:dur="1600">
         <p:blinds dir="vert"/>
       </p:transition>
     </mc:Choice>
-    <mc:Fallback>
+    <mc:Fallback xmlns="">
       <p:transition spd="slow">
         <p:blinds dir="vert"/>
       </p:transition>
@@ -34884,13 +34898,13 @@
   <p:clrMapOvr>
     <a:masterClrMapping/>
   </p:clrMapOvr>
-  <mc:AlternateContent xmlns:mc="http://schemas.openxmlformats.org/markup-compatibility/2006">
-    <mc:Choice xmlns:p14="http://schemas.microsoft.com/office/powerpoint/2010/main" Requires="p14">
+  <mc:AlternateContent xmlns:mc="http://schemas.openxmlformats.org/markup-compatibility/2006" xmlns:p14="http://schemas.microsoft.com/office/powerpoint/2010/main">
+    <mc:Choice Requires="p14">
       <p:transition spd="slow" p14:dur="2500">
         <p:checker/>
       </p:transition>
     </mc:Choice>
-    <mc:Fallback>
+    <mc:Fallback xmlns="">
       <p:transition spd="slow">
         <p:checker/>
       </p:transition>
@@ -35046,13 +35060,13 @@
   <p:clrMapOvr>
     <a:masterClrMapping/>
   </p:clrMapOvr>
-  <mc:AlternateContent xmlns:mc="http://schemas.openxmlformats.org/markup-compatibility/2006">
-    <mc:Choice xmlns:p14="http://schemas.microsoft.com/office/powerpoint/2010/main" Requires="p14">
+  <mc:AlternateContent xmlns:mc="http://schemas.openxmlformats.org/markup-compatibility/2006" xmlns:p14="http://schemas.microsoft.com/office/powerpoint/2010/main">
+    <mc:Choice Requires="p14">
       <p:transition spd="slow" p14:dur="2500">
         <p:checker/>
       </p:transition>
     </mc:Choice>
-    <mc:Fallback>
+    <mc:Fallback xmlns="">
       <p:transition spd="slow">
         <p:checker/>
       </p:transition>
@@ -35741,13 +35755,13 @@
   <p:clrMapOvr>
     <a:masterClrMapping/>
   </p:clrMapOvr>
-  <mc:AlternateContent xmlns:mc="http://schemas.openxmlformats.org/markup-compatibility/2006">
-    <mc:Choice xmlns:p14="http://schemas.microsoft.com/office/powerpoint/2010/main" Requires="p14">
+  <mc:AlternateContent xmlns:mc="http://schemas.openxmlformats.org/markup-compatibility/2006" xmlns:p14="http://schemas.microsoft.com/office/powerpoint/2010/main">
+    <mc:Choice Requires="p14">
       <p:transition spd="med" p14:dur="700">
         <p:fade/>
       </p:transition>
     </mc:Choice>
-    <mc:Fallback>
+    <mc:Fallback xmlns="">
       <p:transition spd="med">
         <p:fade/>
       </p:transition>
@@ -36381,13 +36395,13 @@
   <p:clrMapOvr>
     <a:masterClrMapping/>
   </p:clrMapOvr>
-  <mc:AlternateContent xmlns:mc="http://schemas.openxmlformats.org/markup-compatibility/2006">
-    <mc:Choice xmlns:p14="http://schemas.microsoft.com/office/powerpoint/2010/main" Requires="p14">
+  <mc:AlternateContent xmlns:mc="http://schemas.openxmlformats.org/markup-compatibility/2006" xmlns:p14="http://schemas.microsoft.com/office/powerpoint/2010/main">
+    <mc:Choice Requires="p14">
       <p:transition spd="slow" p14:dur="2500">
         <p:checker/>
       </p:transition>
     </mc:Choice>
-    <mc:Fallback>
+    <mc:Fallback xmlns="">
       <p:transition spd="slow">
         <p:checker/>
       </p:transition>
@@ -36619,13 +36633,13 @@
   <p:clrMapOvr>
     <a:masterClrMapping/>
   </p:clrMapOvr>
-  <mc:AlternateContent xmlns:mc="http://schemas.openxmlformats.org/markup-compatibility/2006">
-    <mc:Choice xmlns:p14="http://schemas.microsoft.com/office/powerpoint/2010/main" Requires="p14">
+  <mc:AlternateContent xmlns:mc="http://schemas.openxmlformats.org/markup-compatibility/2006" xmlns:p14="http://schemas.microsoft.com/office/powerpoint/2010/main">
+    <mc:Choice Requires="p14">
       <p:transition spd="slow" p14:dur="2500">
         <p:checker/>
       </p:transition>
     </mc:Choice>
-    <mc:Fallback>
+    <mc:Fallback xmlns="">
       <p:transition spd="slow">
         <p:checker/>
       </p:transition>
@@ -36780,13 +36794,13 @@
   <p:clrMapOvr>
     <a:masterClrMapping/>
   </p:clrMapOvr>
-  <mc:AlternateContent xmlns:mc="http://schemas.openxmlformats.org/markup-compatibility/2006">
-    <mc:Choice xmlns:p14="http://schemas.microsoft.com/office/powerpoint/2010/main" Requires="p14">
+  <mc:AlternateContent xmlns:mc="http://schemas.openxmlformats.org/markup-compatibility/2006" xmlns:p14="http://schemas.microsoft.com/office/powerpoint/2010/main">
+    <mc:Choice Requires="p14">
       <p:transition spd="slow" p14:dur="2500">
         <p:checker/>
       </p:transition>
     </mc:Choice>
-    <mc:Fallback>
+    <mc:Fallback xmlns="">
       <p:transition spd="slow">
         <p:checker/>
       </p:transition>
@@ -36902,13 +36916,13 @@
   <p:clrMapOvr>
     <a:masterClrMapping/>
   </p:clrMapOvr>
-  <mc:AlternateContent xmlns:mc="http://schemas.openxmlformats.org/markup-compatibility/2006">
-    <mc:Choice xmlns:p14="http://schemas.microsoft.com/office/powerpoint/2010/main" Requires="p14">
+  <mc:AlternateContent xmlns:mc="http://schemas.openxmlformats.org/markup-compatibility/2006" xmlns:p14="http://schemas.microsoft.com/office/powerpoint/2010/main">
+    <mc:Choice Requires="p14">
       <p:transition spd="slow" p14:dur="2500">
         <p:checker/>
       </p:transition>
     </mc:Choice>
-    <mc:Fallback>
+    <mc:Fallback xmlns="">
       <p:transition spd="slow">
         <p:checker/>
       </p:transition>
@@ -37024,13 +37038,13 @@
   <p:clrMapOvr>
     <a:masterClrMapping/>
   </p:clrMapOvr>
-  <mc:AlternateContent xmlns:mc="http://schemas.openxmlformats.org/markup-compatibility/2006">
-    <mc:Choice xmlns:p14="http://schemas.microsoft.com/office/powerpoint/2010/main" Requires="p14">
+  <mc:AlternateContent xmlns:mc="http://schemas.openxmlformats.org/markup-compatibility/2006" xmlns:p14="http://schemas.microsoft.com/office/powerpoint/2010/main">
+    <mc:Choice Requires="p14">
       <p:transition spd="slow" p14:dur="2500">
         <p:checker/>
       </p:transition>
     </mc:Choice>
-    <mc:Fallback>
+    <mc:Fallback xmlns="">
       <p:transition spd="slow">
         <p:checker/>
       </p:transition>
@@ -37550,13 +37564,13 @@
   <p:clrMapOvr>
     <a:masterClrMapping/>
   </p:clrMapOvr>
-  <mc:AlternateContent xmlns:mc="http://schemas.openxmlformats.org/markup-compatibility/2006">
-    <mc:Choice xmlns:p14="http://schemas.microsoft.com/office/powerpoint/2010/main" Requires="p14">
+  <mc:AlternateContent xmlns:mc="http://schemas.openxmlformats.org/markup-compatibility/2006" xmlns:p14="http://schemas.microsoft.com/office/powerpoint/2010/main">
+    <mc:Choice Requires="p14">
       <p:transition spd="slow" p14:dur="2500">
         <p:checker/>
       </p:transition>
     </mc:Choice>
-    <mc:Fallback>
+    <mc:Fallback xmlns="">
       <p:transition spd="slow">
         <p:checker/>
       </p:transition>
@@ -37662,13 +37676,13 @@
   <p:clrMapOvr>
     <a:masterClrMapping/>
   </p:clrMapOvr>
-  <mc:AlternateContent xmlns:mc="http://schemas.openxmlformats.org/markup-compatibility/2006">
-    <mc:Choice xmlns:p14="http://schemas.microsoft.com/office/powerpoint/2010/main" Requires="p14">
+  <mc:AlternateContent xmlns:mc="http://schemas.openxmlformats.org/markup-compatibility/2006" xmlns:p14="http://schemas.microsoft.com/office/powerpoint/2010/main">
+    <mc:Choice Requires="p14">
       <p:transition spd="slow" p14:dur="2500">
         <p:checker/>
       </p:transition>
     </mc:Choice>
-    <mc:Fallback>
+    <mc:Fallback xmlns="">
       <p:transition spd="slow">
         <p:checker/>
       </p:transition>
@@ -37757,14 +37771,14 @@
             <p:ph idx="1"/>
             <p:extLst>
               <p:ext uri="{D42A27DB-BD31-4B8C-83A1-F6EECF244321}">
-                <p14:modId xmlns:p14="http://schemas.microsoft.com/office/powerpoint/2010/main" val="3754351916"/>
+                <p14:modId xmlns:p14="http://schemas.microsoft.com/office/powerpoint/2010/main" val="873893559"/>
               </p:ext>
             </p:extLst>
           </p:nvPr>
         </p:nvGraphicFramePr>
         <p:xfrm>
-          <a:off x="1686371" y="1862356"/>
-          <a:ext cx="8819258" cy="2702587"/>
+          <a:off x="1082180" y="1862356"/>
+          <a:ext cx="10008066" cy="2702587"/>
         </p:xfrm>
         <a:graphic>
           <a:graphicData uri="http://schemas.openxmlformats.org/drawingml/2006/diagram">
@@ -37782,13 +37796,13 @@
   <p:clrMapOvr>
     <a:masterClrMapping/>
   </p:clrMapOvr>
-  <mc:AlternateContent xmlns:mc="http://schemas.openxmlformats.org/markup-compatibility/2006">
-    <mc:Choice xmlns:p14="http://schemas.microsoft.com/office/powerpoint/2010/main" Requires="p14">
+  <mc:AlternateContent xmlns:mc="http://schemas.openxmlformats.org/markup-compatibility/2006" xmlns:p14="http://schemas.microsoft.com/office/powerpoint/2010/main">
+    <mc:Choice Requires="p14">
       <p:transition spd="slow" p14:dur="3900">
         <p14:glitter pattern="hexagon"/>
       </p:transition>
     </mc:Choice>
-    <mc:Fallback>
+    <mc:Fallback xmlns="">
       <p:transition spd="slow">
         <p:fade/>
       </p:transition>
@@ -39006,13 +39020,13 @@
   <p:clrMapOvr>
     <a:masterClrMapping/>
   </p:clrMapOvr>
-  <mc:AlternateContent xmlns:mc="http://schemas.openxmlformats.org/markup-compatibility/2006">
-    <mc:Choice xmlns:p14="http://schemas.microsoft.com/office/powerpoint/2010/main" Requires="p14">
+  <mc:AlternateContent xmlns:mc="http://schemas.openxmlformats.org/markup-compatibility/2006" xmlns:p14="http://schemas.microsoft.com/office/powerpoint/2010/main">
+    <mc:Choice Requires="p14">
       <p:transition spd="slow" p14:dur="3900">
         <p14:glitter pattern="hexagon"/>
       </p:transition>
     </mc:Choice>
-    <mc:Fallback>
+    <mc:Fallback xmlns="">
       <p:transition spd="slow">
         <p:fade/>
       </p:transition>
@@ -39488,13 +39502,13 @@
   <p:clrMapOvr>
     <a:masterClrMapping/>
   </p:clrMapOvr>
-  <mc:AlternateContent xmlns:mc="http://schemas.openxmlformats.org/markup-compatibility/2006">
-    <mc:Choice xmlns:p14="http://schemas.microsoft.com/office/powerpoint/2010/main" Requires="p14">
+  <mc:AlternateContent xmlns:mc="http://schemas.openxmlformats.org/markup-compatibility/2006" xmlns:p14="http://schemas.microsoft.com/office/powerpoint/2010/main">
+    <mc:Choice Requires="p14">
       <p:transition spd="slow" p14:dur="1600">
         <p:blinds dir="vert"/>
       </p:transition>
     </mc:Choice>
-    <mc:Fallback>
+    <mc:Fallback xmlns="">
       <p:transition spd="slow">
         <p:blinds dir="vert"/>
       </p:transition>
@@ -40189,13 +40203,13 @@
   <p:clrMapOvr>
     <a:masterClrMapping/>
   </p:clrMapOvr>
-  <mc:AlternateContent xmlns:mc="http://schemas.openxmlformats.org/markup-compatibility/2006">
-    <mc:Choice xmlns:p14="http://schemas.microsoft.com/office/powerpoint/2010/main" Requires="p14">
+  <mc:AlternateContent xmlns:mc="http://schemas.openxmlformats.org/markup-compatibility/2006" xmlns:p14="http://schemas.microsoft.com/office/powerpoint/2010/main">
+    <mc:Choice Requires="p14">
       <p:transition spd="slow" p14:dur="3900">
         <p14:glitter pattern="hexagon"/>
       </p:transition>
     </mc:Choice>
-    <mc:Fallback>
+    <mc:Fallback xmlns="">
       <p:transition spd="slow">
         <p:fade/>
       </p:transition>
@@ -41180,13 +41194,13 @@
   <p:clrMapOvr>
     <a:masterClrMapping/>
   </p:clrMapOvr>
-  <mc:AlternateContent xmlns:mc="http://schemas.openxmlformats.org/markup-compatibility/2006">
-    <mc:Choice xmlns:p14="http://schemas.microsoft.com/office/powerpoint/2010/main" Requires="p14">
+  <mc:AlternateContent xmlns:mc="http://schemas.openxmlformats.org/markup-compatibility/2006" xmlns:p14="http://schemas.microsoft.com/office/powerpoint/2010/main">
+    <mc:Choice Requires="p14">
       <p:transition spd="slow" p14:dur="1600">
         <p:blinds dir="vert"/>
       </p:transition>
     </mc:Choice>
-    <mc:Fallback>
+    <mc:Fallback xmlns="">
       <p:transition spd="slow">
         <p:blinds dir="vert"/>
       </p:transition>
@@ -42419,13 +42433,13 @@
   <p:clrMapOvr>
     <a:masterClrMapping/>
   </p:clrMapOvr>
-  <mc:AlternateContent xmlns:mc="http://schemas.openxmlformats.org/markup-compatibility/2006">
-    <mc:Choice xmlns:p14="http://schemas.microsoft.com/office/powerpoint/2010/main" Requires="p14">
+  <mc:AlternateContent xmlns:mc="http://schemas.openxmlformats.org/markup-compatibility/2006" xmlns:p14="http://schemas.microsoft.com/office/powerpoint/2010/main">
+    <mc:Choice Requires="p14">
       <p:transition spd="slow" p14:dur="1600">
         <p:blinds dir="vert"/>
       </p:transition>
     </mc:Choice>
-    <mc:Fallback>
+    <mc:Fallback xmlns="">
       <p:transition spd="slow">
         <p:blinds dir="vert"/>
       </p:transition>

</xml_diff>